<commit_message>
Finished first iteration of slides.
</commit_message>
<xml_diff>
--- a/slides/CSFG8.pptx
+++ b/slides/CSFG8.pptx
@@ -598,7 +598,7 @@
             <a:tailEnd/>
           </a:ln>
           <a:extLst>
-            <a:ext uri="{909E8E84-426E-40DD-AFC4-6F175D3DCCD1}">
+            <a:ext uri="{909E8E84-426E-40dd-AFC4-6F175D3DCCD1}">
               <a14:hiddenFill xmlns:a14="http://schemas.microsoft.com/office/drawing/2010/main">
                 <a:solidFill>
                   <a:srgbClr val="FFFFFF"/>
@@ -1060,14 +1060,14 @@
           <a:noFill/>
           <a:ln/>
           <a:extLst>
-            <a:ext uri="{909E8E84-426E-40DD-AFC4-6F175D3DCCD1}">
+            <a:ext uri="{909E8E84-426E-40dd-AFC4-6F175D3DCCD1}">
               <a14:hiddenFill xmlns:a14="http://schemas.microsoft.com/office/drawing/2010/main">
                 <a:solidFill>
                   <a:srgbClr val="FFFFFF"/>
                 </a:solidFill>
               </a14:hiddenFill>
             </a:ext>
-            <a:ext uri="{91240B29-F687-4F45-9708-019B960494DF}">
+            <a:ext uri="{91240B29-F687-4f45-9708-019B960494DF}">
               <a14:hiddenLine xmlns:a14="http://schemas.microsoft.com/office/drawing/2010/main" w="9525">
                 <a:solidFill>
                   <a:srgbClr val="000000"/>
@@ -1111,14 +1111,14 @@
             <a:noFill/>
           </a:ln>
           <a:extLst>
-            <a:ext uri="{909E8E84-426E-40DD-AFC4-6F175D3DCCD1}">
+            <a:ext uri="{909E8E84-426E-40dd-AFC4-6F175D3DCCD1}">
               <a14:hiddenFill xmlns:a14="http://schemas.microsoft.com/office/drawing/2010/main">
                 <a:solidFill>
                   <a:srgbClr val="FFFFFF"/>
                 </a:solidFill>
               </a14:hiddenFill>
             </a:ext>
-            <a:ext uri="{91240B29-F687-4F45-9708-019B960494DF}">
+            <a:ext uri="{91240B29-F687-4f45-9708-019B960494DF}">
               <a14:hiddenLine xmlns:a14="http://schemas.microsoft.com/office/drawing/2010/main" w="9525">
                 <a:solidFill>
                   <a:srgbClr val="000000"/>
@@ -1284,14 +1284,14 @@
           <a:noFill/>
           <a:ln/>
           <a:extLst>
-            <a:ext uri="{909E8E84-426E-40DD-AFC4-6F175D3DCCD1}">
+            <a:ext uri="{909E8E84-426E-40dd-AFC4-6F175D3DCCD1}">
               <a14:hiddenFill xmlns:a14="http://schemas.microsoft.com/office/drawing/2010/main">
                 <a:solidFill>
                   <a:srgbClr val="FFFFFF"/>
                 </a:solidFill>
               </a14:hiddenFill>
             </a:ext>
-            <a:ext uri="{91240B29-F687-4F45-9708-019B960494DF}">
+            <a:ext uri="{91240B29-F687-4f45-9708-019B960494DF}">
               <a14:hiddenLine xmlns:a14="http://schemas.microsoft.com/office/drawing/2010/main" w="9525">
                 <a:solidFill>
                   <a:srgbClr val="000000"/>
@@ -1335,14 +1335,14 @@
             <a:noFill/>
           </a:ln>
           <a:extLst>
-            <a:ext uri="{909E8E84-426E-40DD-AFC4-6F175D3DCCD1}">
+            <a:ext uri="{909E8E84-426E-40dd-AFC4-6F175D3DCCD1}">
               <a14:hiddenFill xmlns:a14="http://schemas.microsoft.com/office/drawing/2010/main">
                 <a:solidFill>
                   <a:srgbClr val="FFFFFF"/>
                 </a:solidFill>
               </a14:hiddenFill>
             </a:ext>
-            <a:ext uri="{91240B29-F687-4F45-9708-019B960494DF}">
+            <a:ext uri="{91240B29-F687-4f45-9708-019B960494DF}">
               <a14:hiddenLine xmlns:a14="http://schemas.microsoft.com/office/drawing/2010/main" w="9525">
                 <a:solidFill>
                   <a:srgbClr val="000000"/>
@@ -1508,14 +1508,14 @@
           <a:noFill/>
           <a:ln/>
           <a:extLst>
-            <a:ext uri="{909E8E84-426E-40DD-AFC4-6F175D3DCCD1}">
+            <a:ext uri="{909E8E84-426E-40dd-AFC4-6F175D3DCCD1}">
               <a14:hiddenFill xmlns:a14="http://schemas.microsoft.com/office/drawing/2010/main">
                 <a:solidFill>
                   <a:srgbClr val="FFFFFF"/>
                 </a:solidFill>
               </a14:hiddenFill>
             </a:ext>
-            <a:ext uri="{91240B29-F687-4F45-9708-019B960494DF}">
+            <a:ext uri="{91240B29-F687-4f45-9708-019B960494DF}">
               <a14:hiddenLine xmlns:a14="http://schemas.microsoft.com/office/drawing/2010/main" w="9525">
                 <a:solidFill>
                   <a:srgbClr val="000000"/>
@@ -1559,14 +1559,14 @@
             <a:noFill/>
           </a:ln>
           <a:extLst>
-            <a:ext uri="{909E8E84-426E-40DD-AFC4-6F175D3DCCD1}">
+            <a:ext uri="{909E8E84-426E-40dd-AFC4-6F175D3DCCD1}">
               <a14:hiddenFill xmlns:a14="http://schemas.microsoft.com/office/drawing/2010/main">
                 <a:solidFill>
                   <a:srgbClr val="FFFFFF"/>
                 </a:solidFill>
               </a14:hiddenFill>
             </a:ext>
-            <a:ext uri="{91240B29-F687-4F45-9708-019B960494DF}">
+            <a:ext uri="{91240B29-F687-4f45-9708-019B960494DF}">
               <a14:hiddenLine xmlns:a14="http://schemas.microsoft.com/office/drawing/2010/main" w="9525">
                 <a:solidFill>
                   <a:srgbClr val="000000"/>
@@ -1732,14 +1732,14 @@
           <a:noFill/>
           <a:ln/>
           <a:extLst>
-            <a:ext uri="{909E8E84-426E-40DD-AFC4-6F175D3DCCD1}">
+            <a:ext uri="{909E8E84-426E-40dd-AFC4-6F175D3DCCD1}">
               <a14:hiddenFill xmlns:a14="http://schemas.microsoft.com/office/drawing/2010/main">
                 <a:solidFill>
                   <a:srgbClr val="FFFFFF"/>
                 </a:solidFill>
               </a14:hiddenFill>
             </a:ext>
-            <a:ext uri="{91240B29-F687-4F45-9708-019B960494DF}">
+            <a:ext uri="{91240B29-F687-4f45-9708-019B960494DF}">
               <a14:hiddenLine xmlns:a14="http://schemas.microsoft.com/office/drawing/2010/main" w="9525">
                 <a:solidFill>
                   <a:srgbClr val="000000"/>
@@ -1783,14 +1783,14 @@
             <a:noFill/>
           </a:ln>
           <a:extLst>
-            <a:ext uri="{909E8E84-426E-40DD-AFC4-6F175D3DCCD1}">
+            <a:ext uri="{909E8E84-426E-40dd-AFC4-6F175D3DCCD1}">
               <a14:hiddenFill xmlns:a14="http://schemas.microsoft.com/office/drawing/2010/main">
                 <a:solidFill>
                   <a:srgbClr val="FFFFFF"/>
                 </a:solidFill>
               </a14:hiddenFill>
             </a:ext>
-            <a:ext uri="{91240B29-F687-4F45-9708-019B960494DF}">
+            <a:ext uri="{91240B29-F687-4f45-9708-019B960494DF}">
               <a14:hiddenLine xmlns:a14="http://schemas.microsoft.com/office/drawing/2010/main" w="9525">
                 <a:solidFill>
                   <a:srgbClr val="000000"/>
@@ -1956,14 +1956,14 @@
           <a:noFill/>
           <a:ln/>
           <a:extLst>
-            <a:ext uri="{909E8E84-426E-40DD-AFC4-6F175D3DCCD1}">
+            <a:ext uri="{909E8E84-426E-40dd-AFC4-6F175D3DCCD1}">
               <a14:hiddenFill xmlns:a14="http://schemas.microsoft.com/office/drawing/2010/main">
                 <a:solidFill>
                   <a:srgbClr val="FFFFFF"/>
                 </a:solidFill>
               </a14:hiddenFill>
             </a:ext>
-            <a:ext uri="{91240B29-F687-4F45-9708-019B960494DF}">
+            <a:ext uri="{91240B29-F687-4f45-9708-019B960494DF}">
               <a14:hiddenLine xmlns:a14="http://schemas.microsoft.com/office/drawing/2010/main" w="9525">
                 <a:solidFill>
                   <a:srgbClr val="000000"/>
@@ -2007,14 +2007,14 @@
             <a:noFill/>
           </a:ln>
           <a:extLst>
-            <a:ext uri="{909E8E84-426E-40DD-AFC4-6F175D3DCCD1}">
+            <a:ext uri="{909E8E84-426E-40dd-AFC4-6F175D3DCCD1}">
               <a14:hiddenFill xmlns:a14="http://schemas.microsoft.com/office/drawing/2010/main">
                 <a:solidFill>
                   <a:srgbClr val="FFFFFF"/>
                 </a:solidFill>
               </a14:hiddenFill>
             </a:ext>
-            <a:ext uri="{91240B29-F687-4F45-9708-019B960494DF}">
+            <a:ext uri="{91240B29-F687-4f45-9708-019B960494DF}">
               <a14:hiddenLine xmlns:a14="http://schemas.microsoft.com/office/drawing/2010/main" w="9525">
                 <a:solidFill>
                   <a:srgbClr val="000000"/>
@@ -2180,14 +2180,14 @@
           <a:noFill/>
           <a:ln/>
           <a:extLst>
-            <a:ext uri="{909E8E84-426E-40DD-AFC4-6F175D3DCCD1}">
+            <a:ext uri="{909E8E84-426E-40dd-AFC4-6F175D3DCCD1}">
               <a14:hiddenFill xmlns:a14="http://schemas.microsoft.com/office/drawing/2010/main">
                 <a:solidFill>
                   <a:srgbClr val="FFFFFF"/>
                 </a:solidFill>
               </a14:hiddenFill>
             </a:ext>
-            <a:ext uri="{91240B29-F687-4F45-9708-019B960494DF}">
+            <a:ext uri="{91240B29-F687-4f45-9708-019B960494DF}">
               <a14:hiddenLine xmlns:a14="http://schemas.microsoft.com/office/drawing/2010/main" w="9525">
                 <a:solidFill>
                   <a:srgbClr val="000000"/>
@@ -2231,14 +2231,14 @@
             <a:noFill/>
           </a:ln>
           <a:extLst>
-            <a:ext uri="{909E8E84-426E-40DD-AFC4-6F175D3DCCD1}">
+            <a:ext uri="{909E8E84-426E-40dd-AFC4-6F175D3DCCD1}">
               <a14:hiddenFill xmlns:a14="http://schemas.microsoft.com/office/drawing/2010/main">
                 <a:solidFill>
                   <a:srgbClr val="FFFFFF"/>
                 </a:solidFill>
               </a14:hiddenFill>
             </a:ext>
-            <a:ext uri="{91240B29-F687-4F45-9708-019B960494DF}">
+            <a:ext uri="{91240B29-F687-4f45-9708-019B960494DF}">
               <a14:hiddenLine xmlns:a14="http://schemas.microsoft.com/office/drawing/2010/main" w="9525">
                 <a:solidFill>
                   <a:srgbClr val="000000"/>
@@ -2404,14 +2404,14 @@
           <a:noFill/>
           <a:ln/>
           <a:extLst>
-            <a:ext uri="{909E8E84-426E-40DD-AFC4-6F175D3DCCD1}">
+            <a:ext uri="{909E8E84-426E-40dd-AFC4-6F175D3DCCD1}">
               <a14:hiddenFill xmlns:a14="http://schemas.microsoft.com/office/drawing/2010/main">
                 <a:solidFill>
                   <a:srgbClr val="FFFFFF"/>
                 </a:solidFill>
               </a14:hiddenFill>
             </a:ext>
-            <a:ext uri="{91240B29-F687-4F45-9708-019B960494DF}">
+            <a:ext uri="{91240B29-F687-4f45-9708-019B960494DF}">
               <a14:hiddenLine xmlns:a14="http://schemas.microsoft.com/office/drawing/2010/main" w="9525">
                 <a:solidFill>
                   <a:srgbClr val="000000"/>
@@ -2455,14 +2455,14 @@
             <a:noFill/>
           </a:ln>
           <a:extLst>
-            <a:ext uri="{909E8E84-426E-40DD-AFC4-6F175D3DCCD1}">
+            <a:ext uri="{909E8E84-426E-40dd-AFC4-6F175D3DCCD1}">
               <a14:hiddenFill xmlns:a14="http://schemas.microsoft.com/office/drawing/2010/main">
                 <a:solidFill>
                   <a:srgbClr val="FFFFFF"/>
                 </a:solidFill>
               </a14:hiddenFill>
             </a:ext>
-            <a:ext uri="{91240B29-F687-4F45-9708-019B960494DF}">
+            <a:ext uri="{91240B29-F687-4f45-9708-019B960494DF}">
               <a14:hiddenLine xmlns:a14="http://schemas.microsoft.com/office/drawing/2010/main" w="9525">
                 <a:solidFill>
                   <a:srgbClr val="000000"/>
@@ -2628,14 +2628,14 @@
           <a:noFill/>
           <a:ln/>
           <a:extLst>
-            <a:ext uri="{909E8E84-426E-40DD-AFC4-6F175D3DCCD1}">
+            <a:ext uri="{909E8E84-426E-40dd-AFC4-6F175D3DCCD1}">
               <a14:hiddenFill xmlns:a14="http://schemas.microsoft.com/office/drawing/2010/main">
                 <a:solidFill>
                   <a:srgbClr val="FFFFFF"/>
                 </a:solidFill>
               </a14:hiddenFill>
             </a:ext>
-            <a:ext uri="{91240B29-F687-4F45-9708-019B960494DF}">
+            <a:ext uri="{91240B29-F687-4f45-9708-019B960494DF}">
               <a14:hiddenLine xmlns:a14="http://schemas.microsoft.com/office/drawing/2010/main" w="9525">
                 <a:solidFill>
                   <a:srgbClr val="000000"/>
@@ -2679,14 +2679,14 @@
             <a:noFill/>
           </a:ln>
           <a:extLst>
-            <a:ext uri="{909E8E84-426E-40DD-AFC4-6F175D3DCCD1}">
+            <a:ext uri="{909E8E84-426E-40dd-AFC4-6F175D3DCCD1}">
               <a14:hiddenFill xmlns:a14="http://schemas.microsoft.com/office/drawing/2010/main">
                 <a:solidFill>
                   <a:srgbClr val="FFFFFF"/>
                 </a:solidFill>
               </a14:hiddenFill>
             </a:ext>
-            <a:ext uri="{91240B29-F687-4F45-9708-019B960494DF}">
+            <a:ext uri="{91240B29-F687-4f45-9708-019B960494DF}">
               <a14:hiddenLine xmlns:a14="http://schemas.microsoft.com/office/drawing/2010/main" w="9525">
                 <a:solidFill>
                   <a:srgbClr val="000000"/>
@@ -2852,14 +2852,14 @@
           <a:noFill/>
           <a:ln/>
           <a:extLst>
-            <a:ext uri="{909E8E84-426E-40DD-AFC4-6F175D3DCCD1}">
+            <a:ext uri="{909E8E84-426E-40dd-AFC4-6F175D3DCCD1}">
               <a14:hiddenFill xmlns:a14="http://schemas.microsoft.com/office/drawing/2010/main">
                 <a:solidFill>
                   <a:srgbClr val="FFFFFF"/>
                 </a:solidFill>
               </a14:hiddenFill>
             </a:ext>
-            <a:ext uri="{91240B29-F687-4F45-9708-019B960494DF}">
+            <a:ext uri="{91240B29-F687-4f45-9708-019B960494DF}">
               <a14:hiddenLine xmlns:a14="http://schemas.microsoft.com/office/drawing/2010/main" w="9525">
                 <a:solidFill>
                   <a:srgbClr val="000000"/>
@@ -2903,14 +2903,14 @@
             <a:noFill/>
           </a:ln>
           <a:extLst>
-            <a:ext uri="{909E8E84-426E-40DD-AFC4-6F175D3DCCD1}">
+            <a:ext uri="{909E8E84-426E-40dd-AFC4-6F175D3DCCD1}">
               <a14:hiddenFill xmlns:a14="http://schemas.microsoft.com/office/drawing/2010/main">
                 <a:solidFill>
                   <a:srgbClr val="FFFFFF"/>
                 </a:solidFill>
               </a14:hiddenFill>
             </a:ext>
-            <a:ext uri="{91240B29-F687-4F45-9708-019B960494DF}">
+            <a:ext uri="{91240B29-F687-4f45-9708-019B960494DF}">
               <a14:hiddenLine xmlns:a14="http://schemas.microsoft.com/office/drawing/2010/main" w="9525">
                 <a:solidFill>
                   <a:srgbClr val="000000"/>
@@ -3076,14 +3076,14 @@
           <a:noFill/>
           <a:ln/>
           <a:extLst>
-            <a:ext uri="{909E8E84-426E-40DD-AFC4-6F175D3DCCD1}">
+            <a:ext uri="{909E8E84-426E-40dd-AFC4-6F175D3DCCD1}">
               <a14:hiddenFill xmlns:a14="http://schemas.microsoft.com/office/drawing/2010/main">
                 <a:solidFill>
                   <a:srgbClr val="FFFFFF"/>
                 </a:solidFill>
               </a14:hiddenFill>
             </a:ext>
-            <a:ext uri="{91240B29-F687-4F45-9708-019B960494DF}">
+            <a:ext uri="{91240B29-F687-4f45-9708-019B960494DF}">
               <a14:hiddenLine xmlns:a14="http://schemas.microsoft.com/office/drawing/2010/main" w="9525">
                 <a:solidFill>
                   <a:srgbClr val="000000"/>
@@ -3127,14 +3127,14 @@
             <a:noFill/>
           </a:ln>
           <a:extLst>
-            <a:ext uri="{909E8E84-426E-40DD-AFC4-6F175D3DCCD1}">
+            <a:ext uri="{909E8E84-426E-40dd-AFC4-6F175D3DCCD1}">
               <a14:hiddenFill xmlns:a14="http://schemas.microsoft.com/office/drawing/2010/main">
                 <a:solidFill>
                   <a:srgbClr val="FFFFFF"/>
                 </a:solidFill>
               </a14:hiddenFill>
             </a:ext>
-            <a:ext uri="{91240B29-F687-4F45-9708-019B960494DF}">
+            <a:ext uri="{91240B29-F687-4f45-9708-019B960494DF}">
               <a14:hiddenLine xmlns:a14="http://schemas.microsoft.com/office/drawing/2010/main" w="9525">
                 <a:solidFill>
                   <a:srgbClr val="000000"/>
@@ -3300,14 +3300,14 @@
           <a:noFill/>
           <a:ln/>
           <a:extLst>
-            <a:ext uri="{909E8E84-426E-40DD-AFC4-6F175D3DCCD1}">
+            <a:ext uri="{909E8E84-426E-40dd-AFC4-6F175D3DCCD1}">
               <a14:hiddenFill xmlns:a14="http://schemas.microsoft.com/office/drawing/2010/main">
                 <a:solidFill>
                   <a:srgbClr val="FFFFFF"/>
                 </a:solidFill>
               </a14:hiddenFill>
             </a:ext>
-            <a:ext uri="{91240B29-F687-4F45-9708-019B960494DF}">
+            <a:ext uri="{91240B29-F687-4f45-9708-019B960494DF}">
               <a14:hiddenLine xmlns:a14="http://schemas.microsoft.com/office/drawing/2010/main" w="9525">
                 <a:solidFill>
                   <a:srgbClr val="000000"/>
@@ -3351,14 +3351,14 @@
             <a:noFill/>
           </a:ln>
           <a:extLst>
-            <a:ext uri="{909E8E84-426E-40DD-AFC4-6F175D3DCCD1}">
+            <a:ext uri="{909E8E84-426E-40dd-AFC4-6F175D3DCCD1}">
               <a14:hiddenFill xmlns:a14="http://schemas.microsoft.com/office/drawing/2010/main">
                 <a:solidFill>
                   <a:srgbClr val="FFFFFF"/>
                 </a:solidFill>
               </a14:hiddenFill>
             </a:ext>
-            <a:ext uri="{91240B29-F687-4F45-9708-019B960494DF}">
+            <a:ext uri="{91240B29-F687-4f45-9708-019B960494DF}">
               <a14:hiddenLine xmlns:a14="http://schemas.microsoft.com/office/drawing/2010/main" w="9525">
                 <a:solidFill>
                   <a:srgbClr val="000000"/>
@@ -3520,14 +3520,14 @@
           <a:noFill/>
           <a:ln/>
           <a:extLst>
-            <a:ext uri="{909E8E84-426E-40DD-AFC4-6F175D3DCCD1}">
+            <a:ext uri="{909E8E84-426E-40dd-AFC4-6F175D3DCCD1}">
               <a14:hiddenFill xmlns:a14="http://schemas.microsoft.com/office/drawing/2010/main">
                 <a:solidFill>
                   <a:srgbClr val="FFFFFF"/>
                 </a:solidFill>
               </a14:hiddenFill>
             </a:ext>
-            <a:ext uri="{91240B29-F687-4F45-9708-019B960494DF}">
+            <a:ext uri="{91240B29-F687-4f45-9708-019B960494DF}">
               <a14:hiddenLine xmlns:a14="http://schemas.microsoft.com/office/drawing/2010/main" w="9525">
                 <a:solidFill>
                   <a:srgbClr val="000000"/>
@@ -3571,14 +3571,14 @@
             <a:noFill/>
           </a:ln>
           <a:extLst>
-            <a:ext uri="{909E8E84-426E-40DD-AFC4-6F175D3DCCD1}">
+            <a:ext uri="{909E8E84-426E-40dd-AFC4-6F175D3DCCD1}">
               <a14:hiddenFill xmlns:a14="http://schemas.microsoft.com/office/drawing/2010/main">
                 <a:solidFill>
                   <a:srgbClr val="FFFFFF"/>
                 </a:solidFill>
               </a14:hiddenFill>
             </a:ext>
-            <a:ext uri="{91240B29-F687-4F45-9708-019B960494DF}">
+            <a:ext uri="{91240B29-F687-4f45-9708-019B960494DF}">
               <a14:hiddenLine xmlns:a14="http://schemas.microsoft.com/office/drawing/2010/main" w="9525">
                 <a:solidFill>
                   <a:srgbClr val="000000"/>
@@ -3744,14 +3744,14 @@
           <a:noFill/>
           <a:ln/>
           <a:extLst>
-            <a:ext uri="{909E8E84-426E-40DD-AFC4-6F175D3DCCD1}">
+            <a:ext uri="{909E8E84-426E-40dd-AFC4-6F175D3DCCD1}">
               <a14:hiddenFill xmlns:a14="http://schemas.microsoft.com/office/drawing/2010/main">
                 <a:solidFill>
                   <a:srgbClr val="FFFFFF"/>
                 </a:solidFill>
               </a14:hiddenFill>
             </a:ext>
-            <a:ext uri="{91240B29-F687-4F45-9708-019B960494DF}">
+            <a:ext uri="{91240B29-F687-4f45-9708-019B960494DF}">
               <a14:hiddenLine xmlns:a14="http://schemas.microsoft.com/office/drawing/2010/main" w="9525">
                 <a:solidFill>
                   <a:srgbClr val="000000"/>
@@ -3795,14 +3795,14 @@
             <a:noFill/>
           </a:ln>
           <a:extLst>
-            <a:ext uri="{909E8E84-426E-40DD-AFC4-6F175D3DCCD1}">
+            <a:ext uri="{909E8E84-426E-40dd-AFC4-6F175D3DCCD1}">
               <a14:hiddenFill xmlns:a14="http://schemas.microsoft.com/office/drawing/2010/main">
                 <a:solidFill>
                   <a:srgbClr val="FFFFFF"/>
                 </a:solidFill>
               </a14:hiddenFill>
             </a:ext>
-            <a:ext uri="{91240B29-F687-4F45-9708-019B960494DF}">
+            <a:ext uri="{91240B29-F687-4f45-9708-019B960494DF}">
               <a14:hiddenLine xmlns:a14="http://schemas.microsoft.com/office/drawing/2010/main" w="9525">
                 <a:solidFill>
                   <a:srgbClr val="000000"/>
@@ -4049,7 +4049,7 @@
   <p:clrMapOvr>
     <a:masterClrMapping/>
   </p:clrMapOvr>
-  <p:transition>
+  <p:transition xmlns:p14="http://schemas.microsoft.com/office/powerpoint/2010/main">
     <p:fade/>
   </p:transition>
 </p:sldLayout>
@@ -4248,7 +4248,7 @@
   <p:clrMapOvr>
     <a:masterClrMapping/>
   </p:clrMapOvr>
-  <p:transition>
+  <p:transition xmlns:p14="http://schemas.microsoft.com/office/powerpoint/2010/main">
     <p:fade/>
   </p:transition>
 </p:sldLayout>
@@ -4457,7 +4457,7 @@
   <p:clrMapOvr>
     <a:masterClrMapping/>
   </p:clrMapOvr>
-  <p:transition>
+  <p:transition xmlns:p14="http://schemas.microsoft.com/office/powerpoint/2010/main">
     <p:fade/>
   </p:transition>
 </p:sldLayout>
@@ -4656,7 +4656,7 @@
   <p:clrMapOvr>
     <a:masterClrMapping/>
   </p:clrMapOvr>
-  <p:transition>
+  <p:transition xmlns:p14="http://schemas.microsoft.com/office/powerpoint/2010/main">
     <p:fade/>
   </p:transition>
 </p:sldLayout>
@@ -4877,7 +4877,7 @@
   <p:clrMapOvr>
     <a:masterClrMapping/>
   </p:clrMapOvr>
-  <p:transition>
+  <p:transition xmlns:p14="http://schemas.microsoft.com/office/powerpoint/2010/main">
     <p:fade/>
   </p:transition>
 </p:sldLayout>
@@ -5194,7 +5194,7 @@
   <p:clrMapOvr>
     <a:masterClrMapping/>
   </p:clrMapOvr>
-  <p:transition>
+  <p:transition xmlns:p14="http://schemas.microsoft.com/office/powerpoint/2010/main">
     <p:fade/>
   </p:transition>
 </p:sldLayout>
@@ -5650,7 +5650,7 @@
   <p:clrMapOvr>
     <a:masterClrMapping/>
   </p:clrMapOvr>
-  <p:transition>
+  <p:transition xmlns:p14="http://schemas.microsoft.com/office/powerpoint/2010/main">
     <p:fade/>
   </p:transition>
 </p:sldLayout>
@@ -5797,7 +5797,7 @@
   <p:clrMapOvr>
     <a:masterClrMapping/>
   </p:clrMapOvr>
-  <p:transition>
+  <p:transition xmlns:p14="http://schemas.microsoft.com/office/powerpoint/2010/main">
     <p:fade/>
   </p:transition>
 </p:sldLayout>
@@ -5921,7 +5921,7 @@
   <p:clrMapOvr>
     <a:masterClrMapping/>
   </p:clrMapOvr>
-  <p:transition>
+  <p:transition xmlns:p14="http://schemas.microsoft.com/office/powerpoint/2010/main">
     <p:fade/>
   </p:transition>
 </p:sldLayout>
@@ -6227,7 +6227,7 @@
   <p:clrMapOvr>
     <a:masterClrMapping/>
   </p:clrMapOvr>
-  <p:transition>
+  <p:transition xmlns:p14="http://schemas.microsoft.com/office/powerpoint/2010/main">
     <p:fade/>
   </p:transition>
 </p:sldLayout>
@@ -6510,7 +6510,7 @@
   <p:clrMapOvr>
     <a:masterClrMapping/>
   </p:clrMapOvr>
-  <p:transition>
+  <p:transition xmlns:p14="http://schemas.microsoft.com/office/powerpoint/2010/main">
     <p:fade/>
   </p:transition>
 </p:sldLayout>
@@ -6564,14 +6564,14 @@
             <a:noFill/>
           </a:ln>
           <a:extLst>
-            <a:ext uri="{909E8E84-426E-40DD-AFC4-6F175D3DCCD1}">
+            <a:ext uri="{909E8E84-426E-40dd-AFC4-6F175D3DCCD1}">
               <a14:hiddenFill xmlns:a14="http://schemas.microsoft.com/office/drawing/2010/main">
                 <a:solidFill>
                   <a:srgbClr val="FFFFFF"/>
                 </a:solidFill>
               </a14:hiddenFill>
             </a:ext>
-            <a:ext uri="{91240B29-F687-4F45-9708-019B960494DF}">
+            <a:ext uri="{91240B29-F687-4f45-9708-019B960494DF}">
               <a14:hiddenLine xmlns:a14="http://schemas.microsoft.com/office/drawing/2010/main" w="9525">
                 <a:solidFill>
                   <a:srgbClr val="000000"/>
@@ -6622,14 +6622,14 @@
             <a:noFill/>
           </a:ln>
           <a:extLst>
-            <a:ext uri="{909E8E84-426E-40DD-AFC4-6F175D3DCCD1}">
+            <a:ext uri="{909E8E84-426E-40dd-AFC4-6F175D3DCCD1}">
               <a14:hiddenFill xmlns:a14="http://schemas.microsoft.com/office/drawing/2010/main">
                 <a:solidFill>
                   <a:srgbClr val="FFFFFF"/>
                 </a:solidFill>
               </a14:hiddenFill>
             </a:ext>
-            <a:ext uri="{91240B29-F687-4F45-9708-019B960494DF}">
+            <a:ext uri="{91240B29-F687-4f45-9708-019B960494DF}">
               <a14:hiddenLine xmlns:a14="http://schemas.microsoft.com/office/drawing/2010/main" w="9525">
                 <a:solidFill>
                   <a:srgbClr val="000000"/>
@@ -6873,7 +6873,7 @@
     <p:sldLayoutId id="2147483658" r:id="rId10"/>
     <p:sldLayoutId id="2147483659" r:id="rId11"/>
   </p:sldLayoutIdLst>
-  <p:transition>
+  <p:transition xmlns:p14="http://schemas.microsoft.com/office/powerpoint/2010/main">
     <p:fade/>
   </p:transition>
   <p:txStyles>
@@ -7296,14 +7296,14 @@
             <a:noFill/>
           </a:ln>
           <a:extLst>
-            <a:ext uri="{909E8E84-426E-40DD-AFC4-6F175D3DCCD1}">
+            <a:ext uri="{909E8E84-426E-40dd-AFC4-6F175D3DCCD1}">
               <a14:hiddenFill xmlns:a14="http://schemas.microsoft.com/office/drawing/2010/main">
                 <a:solidFill>
                   <a:srgbClr val="FFFFFF"/>
                 </a:solidFill>
               </a14:hiddenFill>
             </a:ext>
-            <a:ext uri="{91240B29-F687-4F45-9708-019B960494DF}">
+            <a:ext uri="{91240B29-F687-4f45-9708-019B960494DF}">
               <a14:hiddenLine xmlns:a14="http://schemas.microsoft.com/office/drawing/2010/main" w="9525" algn="ctr">
                 <a:solidFill>
                   <a:srgbClr val="000000"/>
@@ -7357,7 +7357,7 @@
               <a:noFill/>
             </a:ln>
             <a:extLst>
-              <a:ext uri="{91240B29-F687-4F45-9708-019B960494DF}">
+              <a:ext uri="{91240B29-F687-4f45-9708-019B960494DF}">
                 <a14:hiddenLine xmlns:a14="http://schemas.microsoft.com/office/drawing/2010/main" w="9525" algn="ctr">
                   <a:solidFill>
                     <a:srgbClr val="000000"/>
@@ -7526,7 +7526,7 @@
               <a:noFill/>
             </a:ln>
             <a:extLst>
-              <a:ext uri="{91240B29-F687-4F45-9708-019B960494DF}">
+              <a:ext uri="{91240B29-F687-4f45-9708-019B960494DF}">
                 <a14:hiddenLine xmlns:a14="http://schemas.microsoft.com/office/drawing/2010/main" w="9525" algn="ctr">
                   <a:solidFill>
                     <a:srgbClr val="000000"/>
@@ -7657,13 +7657,13 @@
   <p:clrMapOvr>
     <a:masterClrMapping/>
   </p:clrMapOvr>
-  <p:transition>
+  <p:transition xmlns:p14="http://schemas.microsoft.com/office/powerpoint/2010/main">
     <p:fade/>
   </p:transition>
   <p:timing>
     <p:tnLst>
       <p:par>
-        <p:cTn id="1" dur="indefinite" restart="never" nodeType="tmRoot">
+        <p:cTn xmlns:p14="http://schemas.microsoft.com/office/powerpoint/2010/main" id="1" dur="indefinite" restart="never" nodeType="tmRoot">
           <p:childTnLst>
             <p:seq concurrent="1" nextAc="seek">
               <p:cTn id="2" dur="indefinite" nodeType="mainSeq">
@@ -7828,14 +7828,14 @@
             <a:noFill/>
           </a:ln>
           <a:extLst>
-            <a:ext uri="{909E8E84-426E-40DD-AFC4-6F175D3DCCD1}">
+            <a:ext uri="{909E8E84-426E-40dd-AFC4-6F175D3DCCD1}">
               <a14:hiddenFill xmlns:a14="http://schemas.microsoft.com/office/drawing/2010/main">
                 <a:solidFill>
                   <a:srgbClr val="FFFFFF"/>
                 </a:solidFill>
               </a14:hiddenFill>
             </a:ext>
-            <a:ext uri="{91240B29-F687-4F45-9708-019B960494DF}">
+            <a:ext uri="{91240B29-F687-4f45-9708-019B960494DF}">
               <a14:hiddenLine xmlns:a14="http://schemas.microsoft.com/office/drawing/2010/main" w="9525">
                 <a:solidFill>
                   <a:srgbClr val="000000"/>
@@ -7861,8 +7861,13 @@
             </a:pPr>
             <a:r>
               <a:rPr lang="en-GB" dirty="0"/>
-              <a:t>Half the mark for this course is already done</a:t>
-            </a:r>
+              <a:t>Half the mark for this course is already </a:t>
+            </a:r>
+            <a:r>
+              <a:rPr lang="en-GB" dirty="0" smtClean="0"/>
+              <a:t>done.</a:t>
+            </a:r>
+            <a:endParaRPr lang="en-GB" dirty="0"/>
           </a:p>
           <a:p>
             <a:pPr marL="85725" indent="-85725" eaLnBrk="0" hangingPunct="0">
@@ -7875,8 +7880,13 @@
             </a:pPr>
             <a:r>
               <a:rPr lang="en-GB" dirty="0" smtClean="0"/>
-              <a:t>Other class test is tomorrow morning</a:t>
-            </a:r>
+              <a:t>Other class test is tomorrow </a:t>
+            </a:r>
+            <a:r>
+              <a:rPr lang="en-GB" dirty="0" smtClean="0"/>
+              <a:t>morning.</a:t>
+            </a:r>
+            <a:endParaRPr lang="en-GB" dirty="0" smtClean="0"/>
           </a:p>
           <a:p>
             <a:pPr marL="85725" indent="-85725" eaLnBrk="0" hangingPunct="0">
@@ -7893,8 +7903,13 @@
             </a:r>
             <a:r>
               <a:rPr lang="en-GB" dirty="0"/>
-              <a:t>in format to the one we have had</a:t>
-            </a:r>
+              <a:t>in format to the one we have </a:t>
+            </a:r>
+            <a:r>
+              <a:rPr lang="en-GB" dirty="0" smtClean="0"/>
+              <a:t>had.</a:t>
+            </a:r>
+            <a:endParaRPr lang="en-GB" dirty="0"/>
           </a:p>
           <a:p>
             <a:pPr marL="85725" indent="-85725" eaLnBrk="0" hangingPunct="0">
@@ -7910,16 +7925,13 @@
               <a:t>Will be based around exercises similar to </a:t>
             </a:r>
             <a:r>
-              <a:rPr lang="en-GB" dirty="0" err="1"/>
-              <a:t>practicals</a:t>
-            </a:r>
-            <a:r>
-              <a:rPr lang="en-GB" dirty="0"/>
-              <a:t> in our sessions 5-8</a:t>
-            </a:r>
-          </a:p>
-          <a:p>
-            <a:pPr marL="542925" lvl="1" indent="-85725" eaLnBrk="0" hangingPunct="0">
+              <a:rPr lang="en-GB" dirty="0" smtClean="0"/>
+              <a:t>our practical sessions.</a:t>
+            </a:r>
+            <a:endParaRPr lang="en-GB" dirty="0"/>
+          </a:p>
+          <a:p>
+            <a:pPr eaLnBrk="0" hangingPunct="0">
               <a:lnSpc>
                 <a:spcPct val="110000"/>
               </a:lnSpc>
@@ -7928,40 +7940,64 @@
               </a:spcBef>
             </a:pPr>
             <a:r>
-              <a:rPr lang="en-GB" sz="2800" dirty="0">
-                <a:solidFill>
-                  <a:srgbClr val="FFFF99"/>
-                </a:solidFill>
-              </a:rPr>
-              <a:t>You will be given CSV data, and asked to write a program to:</a:t>
-            </a:r>
-          </a:p>
-          <a:p>
-            <a:pPr marL="542925" lvl="1" indent="-85725" eaLnBrk="0" hangingPunct="0">
+              <a:rPr lang="en-GB" sz="2800" dirty="0" smtClean="0"/>
+              <a:t>You </a:t>
+            </a:r>
+            <a:r>
+              <a:rPr lang="en-GB" sz="2800" dirty="0"/>
+              <a:t>will be given CSV data, and asked to write a program </a:t>
+            </a:r>
+            <a:r>
+              <a:rPr lang="en-GB" sz="2800" dirty="0" smtClean="0"/>
+              <a:t>to:</a:t>
+            </a:r>
+          </a:p>
+          <a:p>
+            <a:pPr marL="914400" lvl="1" indent="-457200" eaLnBrk="0" hangingPunct="0">
               <a:lnSpc>
                 <a:spcPct val="110000"/>
               </a:lnSpc>
               <a:spcBef>
                 <a:spcPct val="20000"/>
               </a:spcBef>
-            </a:pPr>
+              <a:buFont typeface="Arial"/>
+              <a:buChar char="•"/>
+            </a:pPr>
+            <a:r>
+              <a:rPr lang="en-GB" sz="2800" dirty="0" smtClean="0">
+                <a:solidFill>
+                  <a:srgbClr val="FFFF99"/>
+                </a:solidFill>
+              </a:rPr>
+              <a:t>Read </a:t>
+            </a:r>
             <a:r>
               <a:rPr lang="en-GB" sz="2800" dirty="0">
                 <a:solidFill>
                   <a:srgbClr val="FFFF99"/>
                 </a:solidFill>
               </a:rPr>
-              <a:t>	- read it in</a:t>
-            </a:r>
-          </a:p>
-          <a:p>
-            <a:pPr marL="542925" lvl="1" indent="-85725" eaLnBrk="0" hangingPunct="0">
+              <a:t>it </a:t>
+            </a:r>
+            <a:r>
+              <a:rPr lang="en-GB" sz="2800" dirty="0" smtClean="0">
+                <a:solidFill>
+                  <a:srgbClr val="FFFF99"/>
+                </a:solidFill>
+              </a:rPr>
+              <a:t>in.</a:t>
+            </a:r>
+          </a:p>
+          <a:p>
+            <a:pPr marL="914400" lvl="1" indent="-457200" eaLnBrk="0" hangingPunct="0">
               <a:lnSpc>
                 <a:spcPct val="110000"/>
               </a:lnSpc>
               <a:spcBef>
                 <a:spcPct val="20000"/>
               </a:spcBef>
+              <a:buFont typeface="Arial"/>
+              <a:buChar char="•"/>
             </a:pPr>
             <a:r>
               <a:rPr lang="en-GB" sz="2800" dirty="0">
@@ -7969,43 +8005,103 @@
                   <a:srgbClr val="FFFF99"/>
                 </a:solidFill>
               </a:rPr>
-              <a:t>	- provide descriptive statistics on it</a:t>
-            </a:r>
-          </a:p>
-          <a:p>
-            <a:pPr marL="542925" lvl="1" indent="-85725" eaLnBrk="0" hangingPunct="0">
+              <a:t>P</a:t>
+            </a:r>
+            <a:r>
+              <a:rPr lang="en-GB" sz="2800" dirty="0" smtClean="0">
+                <a:solidFill>
+                  <a:srgbClr val="FFFF99"/>
+                </a:solidFill>
+              </a:rPr>
+              <a:t>rovide </a:t>
+            </a:r>
+            <a:r>
+              <a:rPr lang="en-GB" sz="2800" dirty="0">
+                <a:solidFill>
+                  <a:srgbClr val="FFFF99"/>
+                </a:solidFill>
+              </a:rPr>
+              <a:t>descriptive statistics on </a:t>
+            </a:r>
+            <a:r>
+              <a:rPr lang="en-GB" sz="2800" dirty="0" smtClean="0">
+                <a:solidFill>
+                  <a:srgbClr val="FFFF99"/>
+                </a:solidFill>
+              </a:rPr>
+              <a:t>it.</a:t>
+            </a:r>
+          </a:p>
+          <a:p>
+            <a:pPr marL="914400" lvl="1" indent="-457200" eaLnBrk="0" hangingPunct="0">
               <a:lnSpc>
                 <a:spcPct val="110000"/>
               </a:lnSpc>
               <a:spcBef>
                 <a:spcPct val="20000"/>
               </a:spcBef>
-            </a:pPr>
+              <a:buFont typeface="Arial"/>
+              <a:buChar char="•"/>
+            </a:pPr>
+            <a:r>
+              <a:rPr lang="en-GB" sz="2800" dirty="0" smtClean="0">
+                <a:solidFill>
+                  <a:srgbClr val="FFFF99"/>
+                </a:solidFill>
+              </a:rPr>
+              <a:t>Generate </a:t>
+            </a:r>
             <a:r>
               <a:rPr lang="en-GB" sz="2800" dirty="0">
                 <a:solidFill>
                   <a:srgbClr val="FFFF99"/>
                 </a:solidFill>
               </a:rPr>
-              <a:t> - generate one or more plots from it</a:t>
-            </a:r>
-          </a:p>
-          <a:p>
-            <a:pPr marL="542925" lvl="1" indent="-85725" eaLnBrk="0" hangingPunct="0">
+              <a:t>one or more plots from </a:t>
+            </a:r>
+            <a:r>
+              <a:rPr lang="en-GB" sz="2800" dirty="0" smtClean="0">
+                <a:solidFill>
+                  <a:srgbClr val="FFFF99"/>
+                </a:solidFill>
+              </a:rPr>
+              <a:t>it.</a:t>
+            </a:r>
+          </a:p>
+          <a:p>
+            <a:pPr marL="914400" lvl="1" indent="-457200" eaLnBrk="0" hangingPunct="0">
               <a:lnSpc>
                 <a:spcPct val="110000"/>
               </a:lnSpc>
               <a:spcBef>
                 <a:spcPct val="20000"/>
               </a:spcBef>
-            </a:pPr>
+              <a:buFont typeface="Arial"/>
+              <a:buChar char="•"/>
+            </a:pPr>
+            <a:r>
+              <a:rPr lang="en-GB" sz="2800" dirty="0" smtClean="0">
+                <a:solidFill>
+                  <a:srgbClr val="FFFF99"/>
+                </a:solidFill>
+              </a:rPr>
+              <a:t>Undertake </a:t>
+            </a:r>
             <a:r>
               <a:rPr lang="en-GB" sz="2800" dirty="0">
                 <a:solidFill>
                   <a:srgbClr val="FFFF99"/>
                 </a:solidFill>
               </a:rPr>
-              <a:t> - undertake one or more hypothesis tests</a:t>
+              <a:t>one or more hypothesis </a:t>
+            </a:r>
+            <a:r>
+              <a:rPr lang="en-GB" sz="2800" dirty="0" smtClean="0">
+                <a:solidFill>
+                  <a:srgbClr val="FFFF99"/>
+                </a:solidFill>
+              </a:rPr>
+              <a:t>tests.</a:t>
             </a:r>
             <a:endParaRPr lang="en-GB" sz="2400" dirty="0"/>
           </a:p>
@@ -8128,13 +8224,13 @@
   <p:clrMapOvr>
     <a:masterClrMapping/>
   </p:clrMapOvr>
-  <p:transition>
+  <p:transition xmlns:p14="http://schemas.microsoft.com/office/powerpoint/2010/main">
     <p:fade/>
   </p:transition>
   <p:timing>
     <p:tnLst>
       <p:par>
-        <p:cTn id="1" dur="indefinite" restart="never" nodeType="tmRoot">
+        <p:cTn xmlns:p14="http://schemas.microsoft.com/office/powerpoint/2010/main" id="1" dur="indefinite" restart="never" nodeType="tmRoot">
           <p:childTnLst>
             <p:seq concurrent="1" nextAc="seek">
               <p:cTn id="2" dur="indefinite" nodeType="mainSeq">
@@ -8384,13 +8480,13 @@
                     </p:cTn>
                   </p:par>
                   <p:par>
-                    <p:cTn id="23" fill="hold" nodeType="clickPar">
+                    <p:cTn id="23" fill="hold">
                       <p:stCondLst>
                         <p:cond delay="indefinite"/>
                       </p:stCondLst>
                       <p:childTnLst>
                         <p:par>
-                          <p:cTn id="24" fill="hold" nodeType="withGroup">
+                          <p:cTn id="24" fill="hold">
                             <p:stCondLst>
                               <p:cond delay="0"/>
                             </p:stCondLst>
@@ -8445,13 +8541,13 @@
                     </p:cTn>
                   </p:par>
                   <p:par>
-                    <p:cTn id="28" fill="hold" nodeType="clickPar">
+                    <p:cTn id="28" fill="hold">
                       <p:stCondLst>
                         <p:cond delay="indefinite"/>
                       </p:stCondLst>
                       <p:childTnLst>
                         <p:par>
-                          <p:cTn id="29" fill="hold" nodeType="withGroup">
+                          <p:cTn id="29" fill="hold">
                             <p:stCondLst>
                               <p:cond delay="0"/>
                             </p:stCondLst>
@@ -8506,13 +8602,13 @@
                     </p:cTn>
                   </p:par>
                   <p:par>
-                    <p:cTn id="33" fill="hold" nodeType="clickPar">
+                    <p:cTn id="33" fill="hold">
                       <p:stCondLst>
                         <p:cond delay="indefinite"/>
                       </p:stCondLst>
                       <p:childTnLst>
                         <p:par>
-                          <p:cTn id="34" fill="hold" nodeType="withGroup">
+                          <p:cTn id="34" fill="hold">
                             <p:stCondLst>
                               <p:cond delay="0"/>
                             </p:stCondLst>
@@ -8567,13 +8663,13 @@
                     </p:cTn>
                   </p:par>
                   <p:par>
-                    <p:cTn id="38" fill="hold" nodeType="clickPar">
+                    <p:cTn id="38" fill="hold">
                       <p:stCondLst>
                         <p:cond delay="indefinite"/>
                       </p:stCondLst>
                       <p:childTnLst>
                         <p:par>
-                          <p:cTn id="39" fill="hold" nodeType="withGroup">
+                          <p:cTn id="39" fill="hold">
                             <p:stCondLst>
                               <p:cond delay="0"/>
                             </p:stCondLst>
@@ -8628,13 +8724,13 @@
                     </p:cTn>
                   </p:par>
                   <p:par>
-                    <p:cTn id="43" fill="hold" nodeType="clickPar">
+                    <p:cTn id="43" fill="hold">
                       <p:stCondLst>
                         <p:cond delay="indefinite"/>
                       </p:stCondLst>
                       <p:childTnLst>
                         <p:par>
-                          <p:cTn id="44" fill="hold" nodeType="withGroup">
+                          <p:cTn id="44" fill="hold">
                             <p:stCondLst>
                               <p:cond delay="0"/>
                             </p:stCondLst>
@@ -8770,7 +8866,15 @@
             </a:r>
             <a:r>
               <a:rPr lang="en-GB" b="0" dirty="0"/>
-              <a:t>ill be 3 hours in length - hopefully you will not need all the time.</a:t>
+              <a:t>ill be </a:t>
+            </a:r>
+            <a:r>
+              <a:rPr lang="en-GB" b="0" dirty="0" smtClean="0"/>
+              <a:t>2 </a:t>
+            </a:r>
+            <a:r>
+              <a:rPr lang="en-GB" b="0" dirty="0"/>
+              <a:t>hours in length - hopefully you will not need all the time.</a:t>
             </a:r>
           </a:p>
           <a:p>
@@ -8778,8 +8882,12 @@
               <a:defRPr/>
             </a:pPr>
             <a:r>
+              <a:rPr lang="en-GB" b="0" dirty="0" smtClean="0"/>
+              <a:t>Open book exam - you </a:t>
+            </a:r>
+            <a:r>
               <a:rPr lang="en-GB" b="0" dirty="0"/>
-              <a:t>You can bring in any notes you like.</a:t>
+              <a:t>can bring in any notes you like.</a:t>
             </a:r>
             <a:endParaRPr lang="en-GB" dirty="0"/>
           </a:p>
@@ -8829,8 +8937,13 @@
             </a:pPr>
             <a:r>
               <a:rPr lang="en-GB" b="0" dirty="0"/>
-              <a:t>Demonstrators will be available to help you if you get stuck – they can remove bugs, but this will be noted and (some) marks deducted!</a:t>
-            </a:r>
+              <a:t>Demonstrators will be available to help </a:t>
+            </a:r>
+            <a:r>
+              <a:rPr lang="en-GB" b="0" dirty="0" smtClean="0"/>
+              <a:t>you with any technical difficulties – but they will not write the code for you!</a:t>
+            </a:r>
+            <a:endParaRPr lang="en-GB" b="0" dirty="0"/>
           </a:p>
           <a:p>
             <a:pPr marL="85725" indent="-85725" eaLnBrk="0" hangingPunct="0">
@@ -9003,13 +9116,13 @@
   <p:clrMapOvr>
     <a:masterClrMapping/>
   </p:clrMapOvr>
-  <p:transition>
+  <p:transition xmlns:p14="http://schemas.microsoft.com/office/powerpoint/2010/main">
     <p:fade/>
   </p:transition>
   <p:timing>
     <p:tnLst>
       <p:par>
-        <p:cTn id="1" dur="indefinite" restart="never" nodeType="tmRoot">
+        <p:cTn xmlns:p14="http://schemas.microsoft.com/office/powerpoint/2010/main" id="1" dur="indefinite" restart="never" nodeType="tmRoot">
           <p:childTnLst>
             <p:seq concurrent="1" nextAc="seek">
               <p:cTn id="2" dur="indefinite" nodeType="mainSeq">
@@ -9418,8 +9531,13 @@
             </a:r>
             <a:r>
               <a:rPr lang="en-GB" b="0" i="1" dirty="0"/>
-              <a:t> datasets (i.e. with same number of items) are correlated (linked)</a:t>
-            </a:r>
+              <a:t> datasets (i.e. with same number of items) are correlated (linked</a:t>
+            </a:r>
+            <a:r>
+              <a:rPr lang="en-GB" b="0" i="1" dirty="0" smtClean="0"/>
+              <a:t>).</a:t>
+            </a:r>
+            <a:endParaRPr lang="en-GB" b="0" i="1" dirty="0"/>
           </a:p>
           <a:p>
             <a:pPr>
@@ -9680,13 +9798,13 @@
   <p:clrMapOvr>
     <a:masterClrMapping/>
   </p:clrMapOvr>
-  <p:transition>
+  <p:transition xmlns:p14="http://schemas.microsoft.com/office/powerpoint/2010/main">
     <p:fade/>
   </p:transition>
   <p:timing>
     <p:tnLst>
       <p:par>
-        <p:cTn id="1" dur="indefinite" restart="never" nodeType="tmRoot">
+        <p:cTn xmlns:p14="http://schemas.microsoft.com/office/powerpoint/2010/main" id="1" dur="indefinite" restart="never" nodeType="tmRoot">
           <p:childTnLst>
             <p:seq concurrent="1" nextAc="seek">
               <p:cTn id="2" dur="indefinite" nodeType="mainSeq">
@@ -10286,8 +10404,13 @@
             </a:pPr>
             <a:r>
               <a:rPr lang="en-GB" b="0" i="1" dirty="0"/>
-              <a:t>Tells you whether the underlying populations of two samples differ in any way (not just means). Non-parametric test, no assumption of normality</a:t>
-            </a:r>
+              <a:t>Tells you whether the underlying populations of two samples differ in any way (not just means). Non-parametric test, no assumption of </a:t>
+            </a:r>
+            <a:r>
+              <a:rPr lang="en-GB" b="0" i="1" dirty="0" smtClean="0"/>
+              <a:t>normality.</a:t>
+            </a:r>
+            <a:endParaRPr lang="en-GB" b="0" i="1" dirty="0"/>
           </a:p>
           <a:p>
             <a:pPr>
@@ -10308,8 +10431,17 @@
             </a:pPr>
             <a:r>
               <a:rPr lang="en-GB" b="0" i="1" dirty="0"/>
-              <a:t>Tells you whether counts of discrete (categorised) data fit an expected pattern. No assumption of normality – but a few restrictions</a:t>
-            </a:r>
+              <a:t>Tells you whether counts of discrete (categorised) data fit an expected pattern. No assumption of normality – but a </a:t>
+            </a:r>
+            <a:r>
+              <a:rPr lang="en-GB" b="0" i="1"/>
+              <a:t>few </a:t>
+            </a:r>
+            <a:r>
+              <a:rPr lang="en-GB" b="0" i="1" smtClean="0"/>
+              <a:t>restrictions.</a:t>
+            </a:r>
+            <a:endParaRPr lang="en-GB" b="0" i="1" dirty="0"/>
           </a:p>
           <a:p>
             <a:pPr>
@@ -10527,13 +10659,13 @@
   <p:clrMapOvr>
     <a:masterClrMapping/>
   </p:clrMapOvr>
-  <p:transition>
+  <p:transition xmlns:p14="http://schemas.microsoft.com/office/powerpoint/2010/main">
     <p:fade/>
   </p:transition>
   <p:timing>
     <p:tnLst>
       <p:par>
-        <p:cTn id="1" dur="indefinite" restart="never" nodeType="tmRoot">
+        <p:cTn xmlns:p14="http://schemas.microsoft.com/office/powerpoint/2010/main" id="1" dur="indefinite" restart="never" nodeType="tmRoot">
           <p:childTnLst>
             <p:seq concurrent="1" nextAc="seek">
               <p:cTn id="2" dur="indefinite" nodeType="mainSeq">
@@ -11318,7 +11450,7 @@
                 <a:latin typeface="Cooper Black" pitchFamily="18" charset="0"/>
                 <a:cs typeface="+mn-cs"/>
               </a:rPr>
-              <a:t>MORNING’S PRACTICAL</a:t>
+              <a:t>Revision practical</a:t>
             </a:r>
             <a:endParaRPr lang="en-US" sz="3600" b="0" dirty="0">
               <a:effectLst>
@@ -11337,13 +11469,13 @@
   <p:clrMapOvr>
     <a:masterClrMapping/>
   </p:clrMapOvr>
-  <p:transition>
+  <p:transition xmlns:p14="http://schemas.microsoft.com/office/powerpoint/2010/main">
     <p:fade/>
   </p:transition>
   <p:timing>
     <p:tnLst>
       <p:par>
-        <p:cTn id="1" dur="indefinite" restart="never" nodeType="tmRoot">
+        <p:cTn xmlns:p14="http://schemas.microsoft.com/office/powerpoint/2010/main" id="1" dur="indefinite" restart="never" nodeType="tmRoot">
           <p:childTnLst>
             <p:seq concurrent="1" nextAc="seek">
               <p:cTn id="2" dur="indefinite" nodeType="mainSeq">
@@ -11981,8 +12113,13 @@
             </a:pPr>
             <a:r>
               <a:rPr lang="en-GB" sz="2800" dirty="0"/>
-              <a:t>Chi-Squared test used for discrete (categorised) data </a:t>
-            </a:r>
+              <a:t>Chi-Squared test used for discrete (categorised) </a:t>
+            </a:r>
+            <a:r>
+              <a:rPr lang="en-GB" sz="2800" dirty="0" smtClean="0"/>
+              <a:t>data:</a:t>
+            </a:r>
+            <a:endParaRPr lang="en-GB" sz="2800" dirty="0"/>
           </a:p>
           <a:p>
             <a:pPr marL="542925" lvl="1" indent="-85725" eaLnBrk="0" hangingPunct="0">
@@ -12000,8 +12137,21 @@
                   <a:srgbClr val="FFFF99"/>
                 </a:solidFill>
               </a:rPr>
-              <a:t>		Foot length – continuous</a:t>
-            </a:r>
+              <a:t>		Foot length – </a:t>
+            </a:r>
+            <a:r>
+              <a:rPr lang="en-GB" sz="2400" dirty="0" smtClean="0">
+                <a:solidFill>
+                  <a:srgbClr val="FFFF99"/>
+                </a:solidFill>
+              </a:rPr>
+              <a:t>continuous.</a:t>
+            </a:r>
+            <a:endParaRPr lang="en-GB" sz="2400" dirty="0">
+              <a:solidFill>
+                <a:srgbClr val="FFFF99"/>
+              </a:solidFill>
+            </a:endParaRPr>
           </a:p>
           <a:p>
             <a:pPr marL="542925" lvl="1" indent="-85725" eaLnBrk="0" hangingPunct="0">
@@ -12019,8 +12169,21 @@
                   <a:srgbClr val="FFFF99"/>
                 </a:solidFill>
               </a:rPr>
-              <a:t>		Shoe size – discrete</a:t>
-            </a:r>
+              <a:t>		Shoe size – </a:t>
+            </a:r>
+            <a:r>
+              <a:rPr lang="en-GB" sz="2400" dirty="0" smtClean="0">
+                <a:solidFill>
+                  <a:srgbClr val="FFFF99"/>
+                </a:solidFill>
+              </a:rPr>
+              <a:t>discrete.</a:t>
+            </a:r>
+            <a:endParaRPr lang="en-GB" sz="2400" dirty="0">
+              <a:solidFill>
+                <a:srgbClr val="FFFF99"/>
+              </a:solidFill>
+            </a:endParaRPr>
           </a:p>
           <a:p>
             <a:pPr marL="85725" indent="-85725" eaLnBrk="0" hangingPunct="0">
@@ -12085,7 +12248,15 @@
                   <a:srgbClr val="FFFF99"/>
                 </a:solidFill>
               </a:rPr>
-              <a:t>B, …)</a:t>
+              <a:t>B, …</a:t>
+            </a:r>
+            <a:r>
+              <a:rPr lang="en-GB" sz="2400" dirty="0" smtClean="0">
+                <a:solidFill>
+                  <a:srgbClr val="FFFF99"/>
+                </a:solidFill>
+              </a:rPr>
+              <a:t>).</a:t>
             </a:r>
             <a:endParaRPr lang="en-GB" sz="2400" dirty="0">
               <a:solidFill>
@@ -12165,7 +12336,15 @@
                   <a:srgbClr val="FFFF99"/>
                 </a:solidFill>
               </a:rPr>
-              <a:t>…)</a:t>
+              <a:t>…</a:t>
+            </a:r>
+            <a:r>
+              <a:rPr lang="en-GB" sz="2400" dirty="0" smtClean="0">
+                <a:solidFill>
+                  <a:srgbClr val="FFFF99"/>
+                </a:solidFill>
+              </a:rPr>
+              <a:t>).</a:t>
             </a:r>
             <a:endParaRPr lang="en-GB" sz="2400" dirty="0">
               <a:solidFill>
@@ -12376,13 +12555,13 @@
   <p:clrMapOvr>
     <a:masterClrMapping/>
   </p:clrMapOvr>
-  <p:transition>
+  <p:transition xmlns:p14="http://schemas.microsoft.com/office/powerpoint/2010/main">
     <p:fade/>
   </p:transition>
   <p:timing>
     <p:tnLst>
       <p:par>
-        <p:cTn id="1" dur="indefinite" restart="never" nodeType="tmRoot">
+        <p:cTn xmlns:p14="http://schemas.microsoft.com/office/powerpoint/2010/main" id="1" dur="indefinite" restart="never" nodeType="tmRoot">
           <p:childTnLst>
             <p:seq concurrent="1" nextAc="seek">
               <p:cTn id="2" dur="indefinite" nodeType="mainSeq">
@@ -12959,8 +13138,13 @@
             </a:pPr>
             <a:r>
               <a:rPr lang="en-GB" sz="2800" dirty="0"/>
-              <a:t>We have many trilobite fossils from one deposit</a:t>
-            </a:r>
+              <a:t>We have many trilobite fossils from one </a:t>
+            </a:r>
+            <a:r>
+              <a:rPr lang="en-GB" sz="2800" dirty="0" smtClean="0"/>
+              <a:t>deposit:</a:t>
+            </a:r>
+            <a:endParaRPr lang="en-GB" sz="2800" dirty="0"/>
           </a:p>
           <a:p>
             <a:pPr marL="542925" lvl="1" indent="-85725" eaLnBrk="0" hangingPunct="0">
@@ -12980,8 +13164,21 @@
                   <a:srgbClr val="FFFF99"/>
                 </a:solidFill>
               </a:rPr>
-              <a:t> Fossils are moults</a:t>
-            </a:r>
+              <a:t> Fossils are </a:t>
+            </a:r>
+            <a:r>
+              <a:rPr lang="en-GB" sz="2800" dirty="0" smtClean="0">
+                <a:solidFill>
+                  <a:srgbClr val="FFFF99"/>
+                </a:solidFill>
+              </a:rPr>
+              <a:t>moults.</a:t>
+            </a:r>
+            <a:endParaRPr lang="en-GB" sz="2800" dirty="0">
+              <a:solidFill>
+                <a:srgbClr val="FFFF99"/>
+              </a:solidFill>
+            </a:endParaRPr>
           </a:p>
           <a:p>
             <a:pPr marL="542925" lvl="1" indent="-85725" eaLnBrk="0" hangingPunct="0">
@@ -13036,12 +13233,20 @@
               <a:t>, and </a:t>
             </a:r>
             <a:r>
-              <a:rPr lang="en-GB" sz="2800" dirty="0" err="1">
+              <a:rPr lang="en-GB" sz="2800" dirty="0" err="1" smtClean="0">
                 <a:solidFill>
                   <a:srgbClr val="FFFF99"/>
                 </a:solidFill>
               </a:rPr>
               <a:t>pygidia</a:t>
+            </a:r>
+            <a:r>
+              <a:rPr lang="en-GB" sz="2800" dirty="0" smtClean="0">
+                <a:solidFill>
+                  <a:srgbClr val="FFFF99"/>
+                </a:solidFill>
+              </a:rPr>
+              <a:t>.</a:t>
             </a:r>
             <a:endParaRPr lang="en-GB" sz="2800" dirty="0">
               <a:solidFill>
@@ -13067,8 +13272,21 @@
                   <a:srgbClr val="FFFF99"/>
                 </a:solidFill>
               </a:rPr>
-              <a:t> Should have ratio of 1:2:1</a:t>
-            </a:r>
+              <a:t> Should have ratio of 1:2:</a:t>
+            </a:r>
+            <a:r>
+              <a:rPr lang="en-GB" sz="2800" dirty="0" smtClean="0">
+                <a:solidFill>
+                  <a:srgbClr val="FFFF99"/>
+                </a:solidFill>
+              </a:rPr>
+              <a:t>1.</a:t>
+            </a:r>
+            <a:endParaRPr lang="en-GB" sz="2800" dirty="0">
+              <a:solidFill>
+                <a:srgbClr val="FFFF99"/>
+              </a:solidFill>
+            </a:endParaRPr>
           </a:p>
           <a:p>
             <a:pPr marL="542925" lvl="1" indent="-85725" eaLnBrk="0" hangingPunct="0">
@@ -13347,14 +13565,14 @@
             <a:noFill/>
           </a:ln>
           <a:extLst>
-            <a:ext uri="{909E8E84-426E-40DD-AFC4-6F175D3DCCD1}">
+            <a:ext uri="{909E8E84-426E-40dd-AFC4-6F175D3DCCD1}">
               <a14:hiddenFill xmlns:a14="http://schemas.microsoft.com/office/drawing/2010/main">
                 <a:solidFill>
                   <a:srgbClr val="FFFFFF"/>
                 </a:solidFill>
               </a14:hiddenFill>
             </a:ext>
-            <a:ext uri="{91240B29-F687-4F45-9708-019B960494DF}">
+            <a:ext uri="{91240B29-F687-4f45-9708-019B960494DF}">
               <a14:hiddenLine xmlns:a14="http://schemas.microsoft.com/office/drawing/2010/main" w="9525">
                 <a:solidFill>
                   <a:srgbClr val="000000"/>
@@ -13401,14 +13619,14 @@
             <a:noFill/>
           </a:ln>
           <a:extLst>
-            <a:ext uri="{909E8E84-426E-40DD-AFC4-6F175D3DCCD1}">
+            <a:ext uri="{909E8E84-426E-40dd-AFC4-6F175D3DCCD1}">
               <a14:hiddenFill xmlns:a14="http://schemas.microsoft.com/office/drawing/2010/main">
                 <a:solidFill>
                   <a:srgbClr val="FFFFFF"/>
                 </a:solidFill>
               </a14:hiddenFill>
             </a:ext>
-            <a:ext uri="{91240B29-F687-4F45-9708-019B960494DF}">
+            <a:ext uri="{91240B29-F687-4f45-9708-019B960494DF}">
               <a14:hiddenLine xmlns:a14="http://schemas.microsoft.com/office/drawing/2010/main" w="9525">
                 <a:solidFill>
                   <a:srgbClr val="000000"/>
@@ -13426,13 +13644,13 @@
   <p:clrMapOvr>
     <a:masterClrMapping/>
   </p:clrMapOvr>
-  <p:transition>
+  <p:transition xmlns:p14="http://schemas.microsoft.com/office/powerpoint/2010/main">
     <p:fade/>
   </p:transition>
   <p:timing>
     <p:tnLst>
       <p:par>
-        <p:cTn id="1" dur="indefinite" restart="never" nodeType="tmRoot">
+        <p:cTn xmlns:p14="http://schemas.microsoft.com/office/powerpoint/2010/main" id="1" dur="indefinite" restart="never" nodeType="tmRoot">
           <p:childTnLst>
             <p:seq concurrent="1" nextAc="seek">
               <p:cTn id="2" dur="indefinite" nodeType="mainSeq">
@@ -14572,13 +14790,13 @@
   <p:clrMapOvr>
     <a:masterClrMapping/>
   </p:clrMapOvr>
-  <p:transition>
+  <p:transition xmlns:p14="http://schemas.microsoft.com/office/powerpoint/2010/main">
     <p:fade/>
   </p:transition>
   <p:timing>
     <p:tnLst>
       <p:par>
-        <p:cTn id="1" dur="indefinite" restart="never" nodeType="tmRoot">
+        <p:cTn xmlns:p14="http://schemas.microsoft.com/office/powerpoint/2010/main" id="1" dur="indefinite" restart="never" nodeType="tmRoot">
           <p:childTnLst>
             <p:seq concurrent="1" nextAc="seek">
               <p:cTn id="2" dur="indefinite" nodeType="mainSeq">
@@ -15194,8 +15412,13 @@
             </a:pPr>
             <a:r>
               <a:rPr lang="en-GB" sz="2800" dirty="0"/>
-              <a:t>Chi-squared test requires an observed/expected table of this form</a:t>
-            </a:r>
+              <a:t>Chi-squared test requires an observed/expected table of this </a:t>
+            </a:r>
+            <a:r>
+              <a:rPr lang="en-GB" sz="2800" dirty="0" smtClean="0"/>
+              <a:t>form.</a:t>
+            </a:r>
+            <a:endParaRPr lang="en-GB" sz="2800" dirty="0"/>
           </a:p>
           <a:p>
             <a:pPr marL="85725" indent="-85725" eaLnBrk="0" hangingPunct="0">
@@ -15209,8 +15432,13 @@
             </a:pPr>
             <a:r>
               <a:rPr lang="en-GB" sz="2800" dirty="0"/>
-              <a:t>Pass the table to the function </a:t>
-            </a:r>
+              <a:t>Pass the table to the </a:t>
+            </a:r>
+            <a:r>
+              <a:rPr lang="en-GB" sz="2800" dirty="0" smtClean="0"/>
+              <a:t>function:</a:t>
+            </a:r>
+            <a:endParaRPr lang="en-GB" sz="2800" dirty="0"/>
           </a:p>
           <a:p>
             <a:pPr marL="85725" indent="-85725" eaLnBrk="0" hangingPunct="0">
@@ -15381,12 +15609,12 @@
               <a:t>is the probability of this </a:t>
             </a:r>
             <a:r>
-              <a:rPr lang="en-GB" sz="2400" dirty="0" err="1"/>
-              <a:t>occuring</a:t>
+              <a:rPr lang="en-GB" sz="2400" dirty="0" smtClean="0"/>
+              <a:t>occurring </a:t>
             </a:r>
             <a:r>
               <a:rPr lang="en-GB" sz="2400" dirty="0"/>
-              <a:t> by chance – here 0.73 – actually quite likely.</a:t>
+              <a:t>by chance – here 0.73 – actually quite likely.</a:t>
             </a:r>
             <a:endParaRPr lang="en-GB" sz="2400" i="1" dirty="0"/>
           </a:p>
@@ -15702,13 +15930,13 @@
   <p:clrMapOvr>
     <a:masterClrMapping/>
   </p:clrMapOvr>
-  <p:transition>
+  <p:transition xmlns:p14="http://schemas.microsoft.com/office/powerpoint/2010/main">
     <p:fade/>
   </p:transition>
   <p:timing>
     <p:tnLst>
       <p:par>
-        <p:cTn id="1" dur="indefinite" restart="never" nodeType="tmRoot">
+        <p:cTn xmlns:p14="http://schemas.microsoft.com/office/powerpoint/2010/main" id="1" dur="indefinite" restart="never" nodeType="tmRoot">
           <p:childTnLst>
             <p:seq concurrent="1" nextAc="seek">
               <p:cTn id="2" dur="indefinite" nodeType="mainSeq">
@@ -16247,8 +16475,21 @@
                   <a:srgbClr val="FFC000"/>
                 </a:solidFill>
               </a:rPr>
-              <a:t>No expected category should be less than 1 (it does not matter what the observed values are)</a:t>
-            </a:r>
+              <a:t>No expected category should be less than 1 (it does not matter what the observed values are</a:t>
+            </a:r>
+            <a:r>
+              <a:rPr lang="en-GB" dirty="0" smtClean="0">
+                <a:solidFill>
+                  <a:srgbClr val="FFC000"/>
+                </a:solidFill>
+              </a:rPr>
+              <a:t>).</a:t>
+            </a:r>
+            <a:endParaRPr lang="en-GB" dirty="0">
+              <a:solidFill>
+                <a:srgbClr val="FFC000"/>
+              </a:solidFill>
+            </a:endParaRPr>
           </a:p>
           <a:p>
             <a:pPr marL="514350" indent="-514350">
@@ -16473,13 +16714,13 @@
   <p:clrMapOvr>
     <a:masterClrMapping/>
   </p:clrMapOvr>
-  <p:transition>
+  <p:transition xmlns:p14="http://schemas.microsoft.com/office/powerpoint/2010/main">
     <p:fade/>
   </p:transition>
   <p:timing>
     <p:tnLst>
       <p:par>
-        <p:cTn id="1" dur="indefinite" restart="never" nodeType="tmRoot">
+        <p:cTn xmlns:p14="http://schemas.microsoft.com/office/powerpoint/2010/main" id="1" dur="indefinite" restart="never" nodeType="tmRoot">
           <p:childTnLst>
             <p:seq concurrent="1" nextAc="seek">
               <p:cTn id="2" dur="indefinite" nodeType="mainSeq">
@@ -16616,14 +16857,14 @@
             <a:noFill/>
           </a:ln>
           <a:extLst>
-            <a:ext uri="{909E8E84-426E-40DD-AFC4-6F175D3DCCD1}">
+            <a:ext uri="{909E8E84-426E-40dd-AFC4-6F175D3DCCD1}">
               <a14:hiddenFill xmlns:a14="http://schemas.microsoft.com/office/drawing/2010/main">
                 <a:solidFill>
                   <a:srgbClr val="FFFFFF"/>
                 </a:solidFill>
               </a14:hiddenFill>
             </a:ext>
-            <a:ext uri="{91240B29-F687-4F45-9708-019B960494DF}">
+            <a:ext uri="{91240B29-F687-4f45-9708-019B960494DF}">
               <a14:hiddenLine xmlns:a14="http://schemas.microsoft.com/office/drawing/2010/main" w="9525" algn="ctr">
                 <a:solidFill>
                   <a:srgbClr val="000000"/>
@@ -16677,7 +16918,7 @@
               <a:noFill/>
             </a:ln>
             <a:extLst>
-              <a:ext uri="{91240B29-F687-4F45-9708-019B960494DF}">
+              <a:ext uri="{91240B29-F687-4f45-9708-019B960494DF}">
                 <a14:hiddenLine xmlns:a14="http://schemas.microsoft.com/office/drawing/2010/main" w="9525" algn="ctr">
                   <a:solidFill>
                     <a:srgbClr val="000000"/>
@@ -16872,7 +17113,7 @@
               <a:noFill/>
             </a:ln>
             <a:extLst>
-              <a:ext uri="{91240B29-F687-4F45-9708-019B960494DF}">
+              <a:ext uri="{91240B29-F687-4f45-9708-019B960494DF}">
                 <a14:hiddenLine xmlns:a14="http://schemas.microsoft.com/office/drawing/2010/main" w="9525" algn="ctr">
                   <a:solidFill>
                     <a:srgbClr val="000000"/>
@@ -17003,13 +17244,13 @@
   <p:clrMapOvr>
     <a:masterClrMapping/>
   </p:clrMapOvr>
-  <p:transition>
+  <p:transition xmlns:p14="http://schemas.microsoft.com/office/powerpoint/2010/main">
     <p:fade/>
   </p:transition>
   <p:timing>
     <p:tnLst>
       <p:par>
-        <p:cTn id="1" dur="indefinite" restart="never" nodeType="tmRoot">
+        <p:cTn xmlns:p14="http://schemas.microsoft.com/office/powerpoint/2010/main" id="1" dur="indefinite" restart="never" nodeType="tmRoot">
           <p:childTnLst>
             <p:seq concurrent="1" nextAc="seek">
               <p:cTn id="2" dur="indefinite" nodeType="mainSeq">
@@ -17174,14 +17415,14 @@
             <a:noFill/>
           </a:ln>
           <a:extLst>
-            <a:ext uri="{909E8E84-426E-40DD-AFC4-6F175D3DCCD1}">
+            <a:ext uri="{909E8E84-426E-40dd-AFC4-6F175D3DCCD1}">
               <a14:hiddenFill xmlns:a14="http://schemas.microsoft.com/office/drawing/2010/main">
                 <a:solidFill>
                   <a:srgbClr val="FFFFFF"/>
                 </a:solidFill>
               </a14:hiddenFill>
             </a:ext>
-            <a:ext uri="{91240B29-F687-4F45-9708-019B960494DF}">
+            <a:ext uri="{91240B29-F687-4f45-9708-019B960494DF}">
               <a14:hiddenLine xmlns:a14="http://schemas.microsoft.com/office/drawing/2010/main" w="9525">
                 <a:solidFill>
                   <a:srgbClr val="000000"/>
@@ -17218,9 +17459,10 @@
               <a:t> </a:t>
             </a:r>
             <a:r>
-              <a:rPr lang="en-GB" dirty="0"/>
-              <a:t>statistics</a:t>
-            </a:r>
+              <a:rPr lang="en-GB" dirty="0" smtClean="0"/>
+              <a:t>statistics.</a:t>
+            </a:r>
+            <a:endParaRPr lang="en-GB" dirty="0"/>
           </a:p>
           <a:p>
             <a:pPr marL="85725" indent="-85725" eaLnBrk="0" hangingPunct="0">
@@ -17233,8 +17475,13 @@
             </a:pPr>
             <a:r>
               <a:rPr lang="en-GB" dirty="0"/>
-              <a:t>Real situations often involve multiple samples</a:t>
-            </a:r>
+              <a:t>Real situations often involve multiple </a:t>
+            </a:r>
+            <a:r>
+              <a:rPr lang="en-GB" dirty="0" smtClean="0"/>
+              <a:t>samples</a:t>
+            </a:r>
+            <a:endParaRPr lang="en-GB" dirty="0"/>
           </a:p>
           <a:p>
             <a:pPr marL="85725" indent="-85725" eaLnBrk="0" hangingPunct="0">
@@ -17247,45 +17494,76 @@
             </a:pPr>
             <a:r>
               <a:rPr lang="en-GB" dirty="0"/>
-              <a:t>Many (complex) statistical procedures exist to work with these – multivariate statistics</a:t>
-            </a:r>
-          </a:p>
-          <a:p>
-            <a:pPr marL="542925" lvl="1" indent="-85725" eaLnBrk="0" hangingPunct="0">
+              <a:t>Many (complex) statistical procedures exist to work with these – multivariate </a:t>
+            </a:r>
+            <a:r>
+              <a:rPr lang="en-GB" dirty="0" smtClean="0"/>
+              <a:t>statistics:</a:t>
+            </a:r>
+            <a:endParaRPr lang="en-GB" dirty="0"/>
+          </a:p>
+          <a:p>
+            <a:pPr marL="457200" indent="-457200" eaLnBrk="0" hangingPunct="0">
               <a:lnSpc>
                 <a:spcPct val="110000"/>
               </a:lnSpc>
               <a:spcBef>
                 <a:spcPct val="20000"/>
               </a:spcBef>
-            </a:pPr>
+              <a:buFont typeface="Arial"/>
+              <a:buChar char="•"/>
+            </a:pPr>
+            <a:r>
+              <a:rPr lang="en-GB" sz="2800" dirty="0" smtClean="0">
+                <a:solidFill>
+                  <a:srgbClr val="FFFF99"/>
+                </a:solidFill>
+              </a:rPr>
+              <a:t>e.g</a:t>
+            </a:r>
             <a:r>
               <a:rPr lang="en-GB" sz="2800" dirty="0">
                 <a:solidFill>
                   <a:srgbClr val="FFFF99"/>
                 </a:solidFill>
               </a:rPr>
-              <a:t>e.g. ANOVA – Analysis Of Variance</a:t>
-            </a:r>
-          </a:p>
-          <a:p>
-            <a:pPr marL="542925" lvl="1" indent="-85725" eaLnBrk="0" hangingPunct="0">
+              <a:t>. ANOVA – Analysis Of </a:t>
+            </a:r>
+            <a:r>
+              <a:rPr lang="en-GB" sz="2800" dirty="0" smtClean="0">
+                <a:solidFill>
+                  <a:srgbClr val="FFFF99"/>
+                </a:solidFill>
+              </a:rPr>
+              <a:t>Variance</a:t>
+            </a:r>
+          </a:p>
+          <a:p>
+            <a:pPr marL="457200" indent="-457200" eaLnBrk="0" hangingPunct="0">
               <a:lnSpc>
                 <a:spcPct val="110000"/>
               </a:lnSpc>
               <a:spcBef>
                 <a:spcPct val="20000"/>
               </a:spcBef>
-              <a:buFontTx/>
-              <a:buChar char="-"/>
-            </a:pPr>
+              <a:buFont typeface="Arial"/>
+              <a:buChar char="•"/>
+            </a:pPr>
+            <a:r>
+              <a:rPr lang="en-GB" sz="2800" dirty="0" smtClean="0">
+                <a:solidFill>
+                  <a:srgbClr val="FFFF99"/>
+                </a:solidFill>
+              </a:rPr>
+              <a:t>Use </a:t>
+            </a:r>
             <a:r>
               <a:rPr lang="en-GB" sz="2800" dirty="0">
                 <a:solidFill>
                   <a:srgbClr val="FFFF99"/>
                 </a:solidFill>
               </a:rPr>
-              <a:t> Use to look for differences in means in multiple normally distributed samples</a:t>
+              <a:t>to look for differences in means in multiple normally distributed samples</a:t>
             </a:r>
           </a:p>
           <a:p>
@@ -17548,13 +17826,13 @@
   <p:clrMapOvr>
     <a:masterClrMapping/>
   </p:clrMapOvr>
-  <p:transition>
+  <p:transition xmlns:p14="http://schemas.microsoft.com/office/powerpoint/2010/main">
     <p:fade/>
   </p:transition>
   <p:timing>
     <p:tnLst>
       <p:par>
-        <p:cTn id="1" dur="indefinite" restart="never" nodeType="tmRoot">
+        <p:cTn xmlns:p14="http://schemas.microsoft.com/office/powerpoint/2010/main" id="1" dur="indefinite" restart="never" nodeType="tmRoot">
           <p:childTnLst>
             <p:seq concurrent="1" nextAc="seek">
               <p:cTn id="2" dur="indefinite" nodeType="mainSeq">
@@ -17743,13 +18021,13 @@
                     </p:cTn>
                   </p:par>
                   <p:par>
-                    <p:cTn id="18" fill="hold" nodeType="clickPar">
+                    <p:cTn id="18" fill="hold">
                       <p:stCondLst>
                         <p:cond delay="indefinite"/>
                       </p:stCondLst>
                       <p:childTnLst>
                         <p:par>
-                          <p:cTn id="19" fill="hold" nodeType="withGroup">
+                          <p:cTn id="19" fill="hold">
                             <p:stCondLst>
                               <p:cond delay="0"/>
                             </p:stCondLst>
@@ -17804,13 +18082,13 @@
                     </p:cTn>
                   </p:par>
                   <p:par>
-                    <p:cTn id="23" fill="hold" nodeType="clickPar">
+                    <p:cTn id="23" fill="hold">
                       <p:stCondLst>
                         <p:cond delay="indefinite"/>
                       </p:stCondLst>
                       <p:childTnLst>
                         <p:par>
-                          <p:cTn id="24" fill="hold" nodeType="withGroup">
+                          <p:cTn id="24" fill="hold">
                             <p:stCondLst>
                               <p:cond delay="0"/>
                             </p:stCondLst>

</xml_diff>